<commit_message>
polishing Introduction to FP with F#
</commit_message>
<xml_diff>
--- a/Introduction to Functional Programming with F#/Introduction to Functional Programming with F#.pptx
+++ b/Introduction to Functional Programming with F#/Introduction to Functional Programming with F#.pptx
@@ -282,6 +282,27 @@
 </p:presentation>
 </file>
 
+<file path=ppt/changesInfos/changesInfo1.xml><?xml version="1.0" encoding="utf-8"?>
+<pc:chgInfo xmlns:a="http://schemas.openxmlformats.org/drawingml/2006/main" xmlns:r="http://schemas.openxmlformats.org/officeDocument/2006/relationships" xmlns:ac="http://schemas.microsoft.com/office/drawing/2013/main/command" xmlns:pc="http://schemas.microsoft.com/office/powerpoint/2013/main/command">
+  <pc:docChgLst>
+    <pc:chgData name="Mariusz Wojcik" userId="e142e3ce-41ae-46f2-89b6-18fcac3e5d8e" providerId="ADAL" clId="{216B0C3C-9438-4786-B4AB-7576F2B72E82}"/>
+    <pc:docChg chg="modSld">
+      <pc:chgData name="Mariusz Wojcik" userId="e142e3ce-41ae-46f2-89b6-18fcac3e5d8e" providerId="ADAL" clId="{216B0C3C-9438-4786-B4AB-7576F2B72E82}" dt="2019-03-26T05:37:01.373" v="0" actId="20577"/>
+      <pc:docMkLst>
+        <pc:docMk/>
+      </pc:docMkLst>
+      <pc:sldChg chg="modNotesTx">
+        <pc:chgData name="Mariusz Wojcik" userId="e142e3ce-41ae-46f2-89b6-18fcac3e5d8e" providerId="ADAL" clId="{216B0C3C-9438-4786-B4AB-7576F2B72E82}" dt="2019-03-26T05:37:01.373" v="0" actId="20577"/>
+        <pc:sldMkLst>
+          <pc:docMk/>
+          <pc:sldMk cId="0" sldId="260"/>
+        </pc:sldMkLst>
+      </pc:sldChg>
+    </pc:docChg>
+  </pc:docChgLst>
+</pc:chgInfo>
+</file>
+
 <file path=ppt/notesMasters/notesMaster1.xml><?xml version="1.0" encoding="utf-8"?>
 <p:notesMaster xmlns:a="http://schemas.openxmlformats.org/drawingml/2006/main" xmlns:r="http://schemas.openxmlformats.org/officeDocument/2006/relationships" xmlns:p="http://schemas.openxmlformats.org/presentationml/2006/main">
   <p:cSld>
@@ -2466,11 +2487,12 @@
               <a:spcAft>
                 <a:spcPts val="0"/>
               </a:spcAft>
-              <a:buNone/>
-            </a:pPr>
-            <a:r>
-              <a:rPr lang="en-GB" dirty="0"/>
-              <a:t>Imperative program consists of commands for the computer to perform.</a:t>
+              <a:buFont typeface="Arial" panose="020B0604020202020204" pitchFamily="34" charset="0"/>
+              <a:buNone/>
+            </a:pPr>
+            <a:r>
+              <a:rPr lang="en-GB" dirty="0"/>
+              <a:t>In much the same way that the imperative mood in natural languages expresses commands, an imperative program consists of commands for the computer to perform.</a:t>
             </a:r>
           </a:p>
           <a:p>
@@ -2483,9 +2505,25 @@
               </a:spcAft>
               <a:buNone/>
             </a:pPr>
-            <a:r>
-              <a:rPr lang="en-GB" dirty="0"/>
-              <a:t>Imperative programming focuses on:</a:t>
+            <a:endParaRPr lang="en-GB"/>
+          </a:p>
+          <a:p>
+            <a:pPr marL="0" lvl="0" indent="0" algn="l" rtl="0">
+              <a:spcBef>
+                <a:spcPts val="0"/>
+              </a:spcBef>
+              <a:spcAft>
+                <a:spcPts val="0"/>
+              </a:spcAft>
+              <a:buNone/>
+            </a:pPr>
+            <a:r>
+              <a:rPr lang="en-GB"/>
+              <a:t>Imperative </a:t>
+            </a:r>
+            <a:r>
+              <a:rPr lang="en-GB" dirty="0"/>
+              <a:t>programming focuses on:</a:t>
             </a:r>
           </a:p>
           <a:p>
@@ -2548,22 +2586,6 @@
               <a:buChar char="•"/>
             </a:pPr>
             <a:endParaRPr lang="en-GB" dirty="0"/>
-          </a:p>
-          <a:p>
-            <a:pPr marL="0" lvl="0" indent="0" algn="l" rtl="0">
-              <a:spcBef>
-                <a:spcPts val="0"/>
-              </a:spcBef>
-              <a:spcAft>
-                <a:spcPts val="0"/>
-              </a:spcAft>
-              <a:buFont typeface="Arial" panose="020B0604020202020204" pitchFamily="34" charset="0"/>
-              <a:buNone/>
-            </a:pPr>
-            <a:r>
-              <a:rPr lang="en-GB" dirty="0"/>
-              <a:t>In much the same way that the imperative mood in natural languages expresses commands, an imperative program consists of commands for the computer to perform.</a:t>
-            </a:r>
           </a:p>
           <a:p>
             <a:pPr marL="0" lvl="0" indent="0" algn="l" rtl="0">

</xml_diff>